<commit_message>
added few more samples
</commit_message>
<xml_diff>
--- a/ppt/nodejs-docker-k8s.pptx
+++ b/ppt/nodejs-docker-k8s.pptx
@@ -13,7 +13,8 @@
     <p:sldId id="268" r:id="rId7"/>
     <p:sldId id="267" r:id="rId8"/>
     <p:sldId id="266" r:id="rId9"/>
-    <p:sldId id="265" r:id="rId10"/>
+    <p:sldId id="269" r:id="rId10"/>
+    <p:sldId id="265" r:id="rId11"/>
   </p:sldIdLst>
   <p:sldSz cx="12192000" cy="6858000"/>
   <p:notesSz cx="6858000" cy="9144000"/>
@@ -279,7 +280,7 @@
           <a:p>
             <a:fld id="{9D19B694-D7DE-4E6B-B933-6E16B84E01AC}" type="datetimeFigureOut">
               <a:rPr lang="en-US" smtClean="0"/>
-              <a:t>10/18/2018</a:t>
+              <a:t>10/22/2018</a:t>
             </a:fld>
             <a:endParaRPr lang="en-US"/>
           </a:p>
@@ -477,7 +478,7 @@
           <a:p>
             <a:fld id="{9D19B694-D7DE-4E6B-B933-6E16B84E01AC}" type="datetimeFigureOut">
               <a:rPr lang="en-US" smtClean="0"/>
-              <a:t>10/18/2018</a:t>
+              <a:t>10/22/2018</a:t>
             </a:fld>
             <a:endParaRPr lang="en-US"/>
           </a:p>
@@ -685,7 +686,7 @@
           <a:p>
             <a:fld id="{9D19B694-D7DE-4E6B-B933-6E16B84E01AC}" type="datetimeFigureOut">
               <a:rPr lang="en-US" smtClean="0"/>
-              <a:t>10/18/2018</a:t>
+              <a:t>10/22/2018</a:t>
             </a:fld>
             <a:endParaRPr lang="en-US"/>
           </a:p>
@@ -883,7 +884,7 @@
           <a:p>
             <a:fld id="{9D19B694-D7DE-4E6B-B933-6E16B84E01AC}" type="datetimeFigureOut">
               <a:rPr lang="en-US" smtClean="0"/>
-              <a:t>10/18/2018</a:t>
+              <a:t>10/22/2018</a:t>
             </a:fld>
             <a:endParaRPr lang="en-US"/>
           </a:p>
@@ -1158,7 +1159,7 @@
           <a:p>
             <a:fld id="{9D19B694-D7DE-4E6B-B933-6E16B84E01AC}" type="datetimeFigureOut">
               <a:rPr lang="en-US" smtClean="0"/>
-              <a:t>10/18/2018</a:t>
+              <a:t>10/22/2018</a:t>
             </a:fld>
             <a:endParaRPr lang="en-US"/>
           </a:p>
@@ -1423,7 +1424,7 @@
           <a:p>
             <a:fld id="{9D19B694-D7DE-4E6B-B933-6E16B84E01AC}" type="datetimeFigureOut">
               <a:rPr lang="en-US" smtClean="0"/>
-              <a:t>10/18/2018</a:t>
+              <a:t>10/22/2018</a:t>
             </a:fld>
             <a:endParaRPr lang="en-US"/>
           </a:p>
@@ -1835,7 +1836,7 @@
           <a:p>
             <a:fld id="{9D19B694-D7DE-4E6B-B933-6E16B84E01AC}" type="datetimeFigureOut">
               <a:rPr lang="en-US" smtClean="0"/>
-              <a:t>10/18/2018</a:t>
+              <a:t>10/22/2018</a:t>
             </a:fld>
             <a:endParaRPr lang="en-US"/>
           </a:p>
@@ -1976,7 +1977,7 @@
           <a:p>
             <a:fld id="{9D19B694-D7DE-4E6B-B933-6E16B84E01AC}" type="datetimeFigureOut">
               <a:rPr lang="en-US" smtClean="0"/>
-              <a:t>10/18/2018</a:t>
+              <a:t>10/22/2018</a:t>
             </a:fld>
             <a:endParaRPr lang="en-US"/>
           </a:p>
@@ -2089,7 +2090,7 @@
           <a:p>
             <a:fld id="{9D19B694-D7DE-4E6B-B933-6E16B84E01AC}" type="datetimeFigureOut">
               <a:rPr lang="en-US" smtClean="0"/>
-              <a:t>10/18/2018</a:t>
+              <a:t>10/22/2018</a:t>
             </a:fld>
             <a:endParaRPr lang="en-US"/>
           </a:p>
@@ -2400,7 +2401,7 @@
           <a:p>
             <a:fld id="{9D19B694-D7DE-4E6B-B933-6E16B84E01AC}" type="datetimeFigureOut">
               <a:rPr lang="en-US" smtClean="0"/>
-              <a:t>10/18/2018</a:t>
+              <a:t>10/22/2018</a:t>
             </a:fld>
             <a:endParaRPr lang="en-US"/>
           </a:p>
@@ -2688,7 +2689,7 @@
           <a:p>
             <a:fld id="{9D19B694-D7DE-4E6B-B933-6E16B84E01AC}" type="datetimeFigureOut">
               <a:rPr lang="en-US" smtClean="0"/>
-              <a:t>10/18/2018</a:t>
+              <a:t>10/22/2018</a:t>
             </a:fld>
             <a:endParaRPr lang="en-US"/>
           </a:p>
@@ -2929,7 +2930,7 @@
           <a:p>
             <a:fld id="{9D19B694-D7DE-4E6B-B933-6E16B84E01AC}" type="datetimeFigureOut">
               <a:rPr lang="en-US" smtClean="0"/>
-              <a:t>10/18/2018</a:t>
+              <a:t>10/22/2018</a:t>
             </a:fld>
             <a:endParaRPr lang="en-US"/>
           </a:p>
@@ -3946,6 +3947,44 @@
           </a:p>
         </p:txBody>
       </p:sp>
+      <p:sp>
+        <p:nvSpPr>
+          <p:cNvPr id="3" name="Rectangle 2">
+            <a:extLst>
+              <a:ext uri="{FF2B5EF4-FFF2-40B4-BE49-F238E27FC236}">
+                <a16:creationId xmlns:a16="http://schemas.microsoft.com/office/drawing/2014/main" id="{EFFBBE25-EA99-43BF-B09A-B188841BFD9C}"/>
+              </a:ext>
+            </a:extLst>
+          </p:cNvPr>
+          <p:cNvSpPr/>
+          <p:nvPr/>
+        </p:nvSpPr>
+        <p:spPr>
+          <a:xfrm>
+            <a:off x="259540" y="3210315"/>
+            <a:ext cx="8317416" cy="369332"/>
+          </a:xfrm>
+          <a:prstGeom prst="rect">
+            <a:avLst/>
+          </a:prstGeom>
+        </p:spPr>
+        <p:txBody>
+          <a:bodyPr wrap="square">
+            <a:spAutoFit/>
+          </a:bodyPr>
+          <a:lstStyle/>
+          <a:p>
+            <a:r>
+              <a:rPr lang="en-US" dirty="0">
+                <a:solidFill>
+                  <a:schemeClr val="bg1"/>
+                </a:solidFill>
+              </a:rPr>
+              <a:t>git clone https://github.com/vishwanathsrikanth/nodejs-docker-k8s-training.git</a:t>
+            </a:r>
+          </a:p>
+        </p:txBody>
+      </p:sp>
     </p:spTree>
     <p:extLst>
       <p:ext uri="{BB962C8B-B14F-4D97-AF65-F5344CB8AC3E}">
@@ -3964,6 +4003,280 @@
       <p:transition spd="slow" advTm="10545"/>
     </mc:Fallback>
   </mc:AlternateContent>
+</p:sld>
+</file>
+
+<file path=ppt/slides/slide10.xml><?xml version="1.0" encoding="utf-8"?>
+<p:sld xmlns:a="http://schemas.openxmlformats.org/drawingml/2006/main" xmlns:r="http://schemas.openxmlformats.org/officeDocument/2006/relationships" xmlns:p="http://schemas.openxmlformats.org/presentationml/2006/main" show="0">
+  <p:cSld>
+    <p:bg>
+      <p:bgPr>
+        <a:solidFill>
+          <a:schemeClr val="bg1"/>
+        </a:solidFill>
+        <a:effectLst/>
+      </p:bgPr>
+    </p:bg>
+    <p:spTree>
+      <p:nvGrpSpPr>
+        <p:cNvPr id="1" name=""/>
+        <p:cNvGrpSpPr/>
+        <p:nvPr/>
+      </p:nvGrpSpPr>
+      <p:grpSpPr>
+        <a:xfrm>
+          <a:off x="0" y="0"/>
+          <a:ext cx="0" cy="0"/>
+          <a:chOff x="0" y="0"/>
+          <a:chExt cx="0" cy="0"/>
+        </a:xfrm>
+      </p:grpSpPr>
+      <p:sp>
+        <p:nvSpPr>
+          <p:cNvPr id="71" name="Rectangle 70">
+            <a:extLst>
+              <a:ext uri="{FF2B5EF4-FFF2-40B4-BE49-F238E27FC236}">
+                <a16:creationId xmlns:a16="http://schemas.microsoft.com/office/drawing/2014/main" id="{823AC064-BC96-4F32-8AE1-B2FD38754823}"/>
+              </a:ext>
+              <a:ext uri="{C183D7F6-B498-43B3-948B-1728B52AA6E4}">
+                <adec:decorative xmlns:adec="http://schemas.microsoft.com/office/drawing/2017/decorative" val="1"/>
+              </a:ext>
+            </a:extLst>
+          </p:cNvPr>
+          <p:cNvSpPr>
+            <a:spLocks noGrp="1" noRot="1" noChangeAspect="1" noMove="1" noResize="1" noEditPoints="1" noAdjustHandles="1" noChangeArrowheads="1" noChangeShapeType="1" noTextEdit="1"/>
+          </p:cNvSpPr>
+          <p:nvPr>
+            <p:extLst>
+              <p:ext uri="{386F3935-93C4-4BCD-93E2-E3B085C9AB24}">
+                <p16:designElem xmlns:p16="http://schemas.microsoft.com/office/powerpoint/2015/main" val="1"/>
+              </p:ext>
+            </p:extLst>
+          </p:nvPr>
+        </p:nvSpPr>
+        <p:spPr bwMode="ltGray">
+          <a:xfrm>
+            <a:off x="378068" y="343486"/>
+            <a:ext cx="11438793" cy="1844256"/>
+          </a:xfrm>
+          <a:prstGeom prst="rect">
+            <a:avLst/>
+          </a:prstGeom>
+          <a:solidFill>
+            <a:srgbClr val="404040"/>
+          </a:solidFill>
+          <a:ln w="127000" cap="sq" cmpd="thinThick">
+            <a:solidFill>
+              <a:srgbClr val="404040"/>
+            </a:solidFill>
+          </a:ln>
+        </p:spPr>
+        <p:style>
+          <a:lnRef idx="2">
+            <a:schemeClr val="accent1">
+              <a:shade val="50000"/>
+            </a:schemeClr>
+          </a:lnRef>
+          <a:fillRef idx="1">
+            <a:schemeClr val="accent1"/>
+          </a:fillRef>
+          <a:effectRef idx="0">
+            <a:schemeClr val="accent1"/>
+          </a:effectRef>
+          <a:fontRef idx="minor">
+            <a:schemeClr val="lt1"/>
+          </a:fontRef>
+        </p:style>
+        <p:txBody>
+          <a:bodyPr rtlCol="0" anchor="ctr"/>
+          <a:lstStyle/>
+          <a:p>
+            <a:pPr marL="0" marR="0" lvl="0" indent="0" algn="ctr" defTabSz="914400" rtl="0" eaLnBrk="1" fontAlgn="auto" latinLnBrk="0" hangingPunct="1">
+              <a:lnSpc>
+                <a:spcPct val="100000"/>
+              </a:lnSpc>
+              <a:spcBef>
+                <a:spcPts val="0"/>
+              </a:spcBef>
+              <a:spcAft>
+                <a:spcPts val="0"/>
+              </a:spcAft>
+              <a:buClrTx/>
+              <a:buSzTx/>
+              <a:buFontTx/>
+              <a:buNone/>
+              <a:tabLst/>
+              <a:defRPr/>
+            </a:pPr>
+            <a:endParaRPr kumimoji="0" lang="en-US" sz="1800" b="0" i="0" u="none" strike="noStrike" kern="1200" cap="none" spc="0" normalizeH="0" baseline="0" noProof="0">
+              <a:ln>
+                <a:noFill/>
+              </a:ln>
+              <a:solidFill>
+                <a:prstClr val="white"/>
+              </a:solidFill>
+              <a:effectLst/>
+              <a:uLnTx/>
+              <a:uFillTx/>
+              <a:latin typeface="Calibri" panose="020F0502020204030204"/>
+              <a:ea typeface="+mn-ea"/>
+              <a:cs typeface="+mn-cs"/>
+            </a:endParaRPr>
+          </a:p>
+        </p:txBody>
+      </p:sp>
+      <p:sp>
+        <p:nvSpPr>
+          <p:cNvPr id="2" name="Title 1">
+            <a:extLst>
+              <a:ext uri="{FF2B5EF4-FFF2-40B4-BE49-F238E27FC236}">
+                <a16:creationId xmlns:a16="http://schemas.microsoft.com/office/drawing/2014/main" id="{C043D2BB-CE85-4BE7-971F-C48E4677CE8B}"/>
+              </a:ext>
+            </a:extLst>
+          </p:cNvPr>
+          <p:cNvSpPr>
+            <a:spLocks noGrp="1"/>
+          </p:cNvSpPr>
+          <p:nvPr>
+            <p:ph type="title"/>
+          </p:nvPr>
+        </p:nvSpPr>
+        <p:spPr>
+          <a:xfrm>
+            <a:off x="526073" y="466578"/>
+            <a:ext cx="11139854" cy="930447"/>
+          </a:xfrm>
+        </p:spPr>
+        <p:txBody>
+          <a:bodyPr vert="horz" lIns="91440" tIns="45720" rIns="91440" bIns="45720" rtlCol="0" anchor="b">
+            <a:normAutofit/>
+          </a:bodyPr>
+          <a:lstStyle/>
+          <a:p>
+            <a:pPr algn="ctr"/>
+            <a:r>
+              <a:rPr lang="en-US" sz="5400" kern="1200">
+                <a:solidFill>
+                  <a:srgbClr val="FFFFFF"/>
+                </a:solidFill>
+                <a:latin typeface="+mj-lt"/>
+                <a:ea typeface="+mj-ea"/>
+                <a:cs typeface="+mj-cs"/>
+              </a:rPr>
+              <a:t>AKS Networking Architecture</a:t>
+            </a:r>
+          </a:p>
+        </p:txBody>
+      </p:sp>
+      <p:cxnSp>
+        <p:nvCxnSpPr>
+          <p:cNvPr id="73" name="Straight Connector 72">
+            <a:extLst>
+              <a:ext uri="{FF2B5EF4-FFF2-40B4-BE49-F238E27FC236}">
+                <a16:creationId xmlns:a16="http://schemas.microsoft.com/office/drawing/2014/main" id="{7E7C77BC-7138-40B1-A15B-20F57A494629}"/>
+              </a:ext>
+              <a:ext uri="{C183D7F6-B498-43B3-948B-1728B52AA6E4}">
+                <adec:decorative xmlns:adec="http://schemas.microsoft.com/office/drawing/2017/decorative" val="1"/>
+              </a:ext>
+            </a:extLst>
+          </p:cNvPr>
+          <p:cNvCxnSpPr>
+            <a:cxnSpLocks noGrp="1" noRot="1" noChangeAspect="1" noMove="1" noResize="1" noEditPoints="1" noAdjustHandles="1" noChangeArrowheads="1" noChangeShapeType="1"/>
+          </p:cNvCxnSpPr>
+          <p:nvPr>
+            <p:extLst>
+              <p:ext uri="{386F3935-93C4-4BCD-93E2-E3B085C9AB24}">
+                <p16:designElem xmlns:p16="http://schemas.microsoft.com/office/powerpoint/2015/main" val="1"/>
+              </p:ext>
+            </p:extLst>
+          </p:nvPr>
+        </p:nvCxnSpPr>
+        <p:spPr>
+          <a:xfrm>
+            <a:off x="2209800" y="1448631"/>
+            <a:ext cx="7772400" cy="0"/>
+          </a:xfrm>
+          <a:prstGeom prst="line">
+            <a:avLst/>
+          </a:prstGeom>
+          <a:ln w="22225">
+            <a:solidFill>
+              <a:srgbClr val="D9D9D9"/>
+            </a:solidFill>
+          </a:ln>
+        </p:spPr>
+        <p:style>
+          <a:lnRef idx="1">
+            <a:schemeClr val="accent1"/>
+          </a:lnRef>
+          <a:fillRef idx="0">
+            <a:schemeClr val="accent1"/>
+          </a:fillRef>
+          <a:effectRef idx="0">
+            <a:schemeClr val="accent1"/>
+          </a:effectRef>
+          <a:fontRef idx="minor">
+            <a:schemeClr val="tx1"/>
+          </a:fontRef>
+        </p:style>
+      </p:cxnSp>
+      <p:pic>
+        <p:nvPicPr>
+          <p:cNvPr id="1026" name="Picture 2" descr="https://i.stack.imgur.com/pgz6R.png">
+            <a:extLst>
+              <a:ext uri="{FF2B5EF4-FFF2-40B4-BE49-F238E27FC236}">
+                <a16:creationId xmlns:a16="http://schemas.microsoft.com/office/drawing/2014/main" id="{465CA2AE-7B65-4B1D-9734-23A41C1DCFDD}"/>
+              </a:ext>
+            </a:extLst>
+          </p:cNvPr>
+          <p:cNvPicPr>
+            <a:picLocks noChangeAspect="1" noChangeArrowheads="1"/>
+          </p:cNvPicPr>
+          <p:nvPr/>
+        </p:nvPicPr>
+        <p:blipFill>
+          <a:blip r:embed="rId2">
+            <a:extLst>
+              <a:ext uri="{28A0092B-C50C-407E-A947-70E740481C1C}">
+                <a14:useLocalDpi xmlns:a14="http://schemas.microsoft.com/office/drawing/2010/main" val="0"/>
+              </a:ext>
+            </a:extLst>
+          </a:blip>
+          <a:srcRect/>
+          <a:stretch>
+            <a:fillRect/>
+          </a:stretch>
+        </p:blipFill>
+        <p:spPr bwMode="auto">
+          <a:xfrm>
+            <a:off x="1039975" y="2509911"/>
+            <a:ext cx="10056951" cy="3997637"/>
+          </a:xfrm>
+          <a:prstGeom prst="rect">
+            <a:avLst/>
+          </a:prstGeom>
+          <a:noFill/>
+          <a:extLst>
+            <a:ext uri="{909E8E84-426E-40DD-AFC4-6F175D3DCCD1}">
+              <a14:hiddenFill xmlns:a14="http://schemas.microsoft.com/office/drawing/2010/main">
+                <a:solidFill>
+                  <a:srgbClr val="FFFFFF"/>
+                </a:solidFill>
+              </a14:hiddenFill>
+            </a:ext>
+          </a:extLst>
+        </p:spPr>
+      </p:pic>
+    </p:spTree>
+    <p:extLst>
+      <p:ext uri="{BB962C8B-B14F-4D97-AF65-F5344CB8AC3E}">
+        <p14:creationId xmlns:p14="http://schemas.microsoft.com/office/powerpoint/2010/main" val="115190440"/>
+      </p:ext>
+    </p:extLst>
+  </p:cSld>
+  <p:clrMapOvr>
+    <a:masterClrMapping/>
+  </p:clrMapOvr>
 </p:sld>
 </file>
 
@@ -10132,12 +10445,12 @@
 </file>
 
 <file path=ppt/slides/slide9.xml><?xml version="1.0" encoding="utf-8"?>
-<p:sld xmlns:a="http://schemas.openxmlformats.org/drawingml/2006/main" xmlns:r="http://schemas.openxmlformats.org/officeDocument/2006/relationships" xmlns:p="http://schemas.openxmlformats.org/presentationml/2006/main" show="0">
+<p:sld xmlns:a="http://schemas.openxmlformats.org/drawingml/2006/main" xmlns:r="http://schemas.openxmlformats.org/officeDocument/2006/relationships" xmlns:p="http://schemas.openxmlformats.org/presentationml/2006/main">
   <p:cSld>
     <p:bg>
       <p:bgPr>
         <a:solidFill>
-          <a:schemeClr val="bg1"/>
+          <a:srgbClr val="002060"/>
         </a:solidFill>
         <a:effectLst/>
       </p:bgPr>
@@ -10158,100 +10471,6 @@
       </p:grpSpPr>
       <p:sp>
         <p:nvSpPr>
-          <p:cNvPr id="71" name="Rectangle 70">
-            <a:extLst>
-              <a:ext uri="{FF2B5EF4-FFF2-40B4-BE49-F238E27FC236}">
-                <a16:creationId xmlns:a16="http://schemas.microsoft.com/office/drawing/2014/main" id="{823AC064-BC96-4F32-8AE1-B2FD38754823}"/>
-              </a:ext>
-              <a:ext uri="{C183D7F6-B498-43B3-948B-1728B52AA6E4}">
-                <adec:decorative xmlns:adec="http://schemas.microsoft.com/office/drawing/2017/decorative" val="1"/>
-              </a:ext>
-            </a:extLst>
-          </p:cNvPr>
-          <p:cNvSpPr>
-            <a:spLocks noGrp="1" noRot="1" noChangeAspect="1" noMove="1" noResize="1" noEditPoints="1" noAdjustHandles="1" noChangeArrowheads="1" noChangeShapeType="1" noTextEdit="1"/>
-          </p:cNvSpPr>
-          <p:nvPr>
-            <p:extLst>
-              <p:ext uri="{386F3935-93C4-4BCD-93E2-E3B085C9AB24}">
-                <p16:designElem xmlns:p16="http://schemas.microsoft.com/office/powerpoint/2015/main" val="1"/>
-              </p:ext>
-            </p:extLst>
-          </p:nvPr>
-        </p:nvSpPr>
-        <p:spPr bwMode="ltGray">
-          <a:xfrm>
-            <a:off x="378068" y="343486"/>
-            <a:ext cx="11438793" cy="1844256"/>
-          </a:xfrm>
-          <a:prstGeom prst="rect">
-            <a:avLst/>
-          </a:prstGeom>
-          <a:solidFill>
-            <a:srgbClr val="404040"/>
-          </a:solidFill>
-          <a:ln w="127000" cap="sq" cmpd="thinThick">
-            <a:solidFill>
-              <a:srgbClr val="404040"/>
-            </a:solidFill>
-          </a:ln>
-        </p:spPr>
-        <p:style>
-          <a:lnRef idx="2">
-            <a:schemeClr val="accent1">
-              <a:shade val="50000"/>
-            </a:schemeClr>
-          </a:lnRef>
-          <a:fillRef idx="1">
-            <a:schemeClr val="accent1"/>
-          </a:fillRef>
-          <a:effectRef idx="0">
-            <a:schemeClr val="accent1"/>
-          </a:effectRef>
-          <a:fontRef idx="minor">
-            <a:schemeClr val="lt1"/>
-          </a:fontRef>
-        </p:style>
-        <p:txBody>
-          <a:bodyPr rtlCol="0" anchor="ctr"/>
-          <a:lstStyle/>
-          <a:p>
-            <a:pPr marL="0" marR="0" lvl="0" indent="0" algn="ctr" defTabSz="914400" rtl="0" eaLnBrk="1" fontAlgn="auto" latinLnBrk="0" hangingPunct="1">
-              <a:lnSpc>
-                <a:spcPct val="100000"/>
-              </a:lnSpc>
-              <a:spcBef>
-                <a:spcPts val="0"/>
-              </a:spcBef>
-              <a:spcAft>
-                <a:spcPts val="0"/>
-              </a:spcAft>
-              <a:buClrTx/>
-              <a:buSzTx/>
-              <a:buFontTx/>
-              <a:buNone/>
-              <a:tabLst/>
-              <a:defRPr/>
-            </a:pPr>
-            <a:endParaRPr kumimoji="0" lang="en-US" sz="1800" b="0" i="0" u="none" strike="noStrike" kern="1200" cap="none" spc="0" normalizeH="0" baseline="0" noProof="0">
-              <a:ln>
-                <a:noFill/>
-              </a:ln>
-              <a:solidFill>
-                <a:prstClr val="white"/>
-              </a:solidFill>
-              <a:effectLst/>
-              <a:uLnTx/>
-              <a:uFillTx/>
-              <a:latin typeface="Calibri" panose="020F0502020204030204"/>
-              <a:ea typeface="+mn-ea"/>
-              <a:cs typeface="+mn-cs"/>
-            </a:endParaRPr>
-          </a:p>
-        </p:txBody>
-      </p:sp>
-      <p:sp>
-        <p:nvSpPr>
           <p:cNvPr id="2" name="Title 1">
             <a:extLst>
               <a:ext uri="{FF2B5EF4-FFF2-40B4-BE49-F238E27FC236}">
@@ -10268,134 +10487,146 @@
         </p:nvSpPr>
         <p:spPr>
           <a:xfrm>
-            <a:off x="526073" y="466578"/>
-            <a:ext cx="11139854" cy="930447"/>
+            <a:off x="371272" y="160844"/>
+            <a:ext cx="10515600" cy="1325563"/>
           </a:xfrm>
         </p:spPr>
         <p:txBody>
-          <a:bodyPr vert="horz" lIns="91440" tIns="45720" rIns="91440" bIns="45720" rtlCol="0" anchor="b">
+          <a:bodyPr/>
+          <a:lstStyle/>
+          <a:p>
+            <a:r>
+              <a:rPr lang="en-US" dirty="0">
+                <a:solidFill>
+                  <a:schemeClr val="bg1"/>
+                </a:solidFill>
+              </a:rPr>
+              <a:t>Further Reading</a:t>
+            </a:r>
+          </a:p>
+        </p:txBody>
+      </p:sp>
+      <p:sp>
+        <p:nvSpPr>
+          <p:cNvPr id="4" name="Content Placeholder 2">
+            <a:extLst>
+              <a:ext uri="{FF2B5EF4-FFF2-40B4-BE49-F238E27FC236}">
+                <a16:creationId xmlns:a16="http://schemas.microsoft.com/office/drawing/2014/main" id="{A112B3E0-437F-4B03-A42E-2167007C2E79}"/>
+              </a:ext>
+            </a:extLst>
+          </p:cNvPr>
+          <p:cNvSpPr>
+            <a:spLocks noGrp="1"/>
+          </p:cNvSpPr>
+          <p:nvPr>
+            <p:ph idx="1"/>
+          </p:nvPr>
+        </p:nvSpPr>
+        <p:spPr>
+          <a:xfrm>
+            <a:off x="371272" y="1360468"/>
+            <a:ext cx="9554124" cy="2721082"/>
+          </a:xfrm>
+        </p:spPr>
+        <p:txBody>
+          <a:bodyPr>
             <a:normAutofit/>
           </a:bodyPr>
           <a:lstStyle/>
           <a:p>
-            <a:pPr algn="ctr"/>
-            <a:r>
-              <a:rPr lang="en-US" sz="5400" kern="1200">
+            <a:r>
+              <a:rPr lang="en-US" sz="1900" dirty="0">
                 <a:solidFill>
-                  <a:srgbClr val="FFFFFF"/>
+                  <a:schemeClr val="bg1"/>
                 </a:solidFill>
                 <a:latin typeface="+mj-lt"/>
                 <a:ea typeface="+mj-ea"/>
                 <a:cs typeface="+mj-cs"/>
+                <a:hlinkClick r:id="rId2"/>
               </a:rPr>
-              <a:t>AKS Networking Architecture</a:t>
-            </a:r>
-          </a:p>
-        </p:txBody>
-      </p:sp>
-      <p:cxnSp>
-        <p:nvCxnSpPr>
-          <p:cNvPr id="73" name="Straight Connector 72">
-            <a:extLst>
-              <a:ext uri="{FF2B5EF4-FFF2-40B4-BE49-F238E27FC236}">
-                <a16:creationId xmlns:a16="http://schemas.microsoft.com/office/drawing/2014/main" id="{7E7C77BC-7138-40B1-A15B-20F57A494629}"/>
-              </a:ext>
-              <a:ext uri="{C183D7F6-B498-43B3-948B-1728B52AA6E4}">
-                <adec:decorative xmlns:adec="http://schemas.microsoft.com/office/drawing/2017/decorative" val="1"/>
-              </a:ext>
-            </a:extLst>
-          </p:cNvPr>
-          <p:cNvCxnSpPr>
-            <a:cxnSpLocks noGrp="1" noRot="1" noChangeAspect="1" noMove="1" noResize="1" noEditPoints="1" noAdjustHandles="1" noChangeArrowheads="1" noChangeShapeType="1"/>
-          </p:cNvCxnSpPr>
-          <p:nvPr>
-            <p:extLst>
-              <p:ext uri="{386F3935-93C4-4BCD-93E2-E3B085C9AB24}">
-                <p16:designElem xmlns:p16="http://schemas.microsoft.com/office/powerpoint/2015/main" val="1"/>
-              </p:ext>
-            </p:extLst>
-          </p:nvPr>
-        </p:nvCxnSpPr>
-        <p:spPr>
-          <a:xfrm>
-            <a:off x="2209800" y="1448631"/>
-            <a:ext cx="7772400" cy="0"/>
-          </a:xfrm>
-          <a:prstGeom prst="line">
-            <a:avLst/>
-          </a:prstGeom>
-          <a:ln w="22225">
-            <a:solidFill>
-              <a:srgbClr val="D9D9D9"/>
-            </a:solidFill>
-          </a:ln>
-        </p:spPr>
-        <p:style>
-          <a:lnRef idx="1">
-            <a:schemeClr val="accent1"/>
-          </a:lnRef>
-          <a:fillRef idx="0">
-            <a:schemeClr val="accent1"/>
-          </a:fillRef>
-          <a:effectRef idx="0">
-            <a:schemeClr val="accent1"/>
-          </a:effectRef>
-          <a:fontRef idx="minor">
-            <a:schemeClr val="tx1"/>
-          </a:fontRef>
-        </p:style>
-      </p:cxnSp>
-      <p:pic>
-        <p:nvPicPr>
-          <p:cNvPr id="1026" name="Picture 2" descr="https://i.stack.imgur.com/pgz6R.png">
-            <a:extLst>
-              <a:ext uri="{FF2B5EF4-FFF2-40B4-BE49-F238E27FC236}">
-                <a16:creationId xmlns:a16="http://schemas.microsoft.com/office/drawing/2014/main" id="{465CA2AE-7B65-4B1D-9734-23A41C1DCFDD}"/>
-              </a:ext>
-            </a:extLst>
-          </p:cNvPr>
-          <p:cNvPicPr>
-            <a:picLocks noChangeAspect="1" noChangeArrowheads="1"/>
-          </p:cNvPicPr>
-          <p:nvPr/>
-        </p:nvPicPr>
-        <p:blipFill>
-          <a:blip r:embed="rId2">
-            <a:extLst>
-              <a:ext uri="{28A0092B-C50C-407E-A947-70E740481C1C}">
-                <a14:useLocalDpi xmlns:a14="http://schemas.microsoft.com/office/drawing/2010/main" val="0"/>
-              </a:ext>
-            </a:extLst>
-          </a:blip>
-          <a:srcRect/>
-          <a:stretch>
-            <a:fillRect/>
-          </a:stretch>
-        </p:blipFill>
-        <p:spPr bwMode="auto">
-          <a:xfrm>
-            <a:off x="1039975" y="2509911"/>
-            <a:ext cx="10056951" cy="3997637"/>
-          </a:xfrm>
-          <a:prstGeom prst="rect">
-            <a:avLst/>
-          </a:prstGeom>
-          <a:noFill/>
-          <a:extLst>
-            <a:ext uri="{909E8E84-426E-40DD-AFC4-6F175D3DCCD1}">
-              <a14:hiddenFill xmlns:a14="http://schemas.microsoft.com/office/drawing/2010/main">
+              <a:t>Kubernetes Custom Resource Definition (CRD)</a:t>
+            </a:r>
+            <a:endParaRPr lang="en-US" sz="1900" dirty="0">
+              <a:solidFill>
+                <a:schemeClr val="bg1"/>
+              </a:solidFill>
+              <a:latin typeface="+mj-lt"/>
+              <a:ea typeface="+mj-ea"/>
+              <a:cs typeface="+mj-cs"/>
+            </a:endParaRPr>
+          </a:p>
+          <a:p>
+            <a:r>
+              <a:rPr lang="en-US" sz="1900" dirty="0">
                 <a:solidFill>
-                  <a:srgbClr val="FFFFFF"/>
+                  <a:schemeClr val="bg1"/>
                 </a:solidFill>
-              </a14:hiddenFill>
-            </a:ext>
-          </a:extLst>
-        </p:spPr>
-      </p:pic>
+                <a:latin typeface="+mj-lt"/>
+                <a:ea typeface="+mj-ea"/>
+                <a:cs typeface="+mj-cs"/>
+                <a:hlinkClick r:id="rId3"/>
+              </a:rPr>
+              <a:t>Kubeless</a:t>
+            </a:r>
+            <a:endParaRPr lang="en-US" sz="1900" dirty="0">
+              <a:solidFill>
+                <a:schemeClr val="bg1"/>
+              </a:solidFill>
+              <a:latin typeface="+mj-lt"/>
+              <a:ea typeface="+mj-ea"/>
+              <a:cs typeface="+mj-cs"/>
+            </a:endParaRPr>
+          </a:p>
+          <a:p>
+            <a:r>
+              <a:rPr lang="en-US" sz="1900" dirty="0">
+                <a:solidFill>
+                  <a:schemeClr val="bg1"/>
+                </a:solidFill>
+                <a:latin typeface="+mj-lt"/>
+                <a:ea typeface="+mj-ea"/>
+                <a:cs typeface="+mj-cs"/>
+                <a:hlinkClick r:id="rId4"/>
+              </a:rPr>
+              <a:t>HELM</a:t>
+            </a:r>
+            <a:endParaRPr lang="en-US" sz="1900" dirty="0">
+              <a:solidFill>
+                <a:schemeClr val="bg1"/>
+              </a:solidFill>
+              <a:latin typeface="+mj-lt"/>
+              <a:ea typeface="+mj-ea"/>
+              <a:cs typeface="+mj-cs"/>
+            </a:endParaRPr>
+          </a:p>
+          <a:p>
+            <a:r>
+              <a:rPr lang="en-US" sz="1900" dirty="0">
+                <a:solidFill>
+                  <a:schemeClr val="bg1"/>
+                </a:solidFill>
+                <a:latin typeface="+mj-lt"/>
+                <a:ea typeface="+mj-ea"/>
+                <a:cs typeface="+mj-cs"/>
+                <a:hlinkClick r:id="rId5"/>
+              </a:rPr>
+              <a:t>ISTIO</a:t>
+            </a:r>
+            <a:endParaRPr lang="en-US" sz="1900" dirty="0">
+              <a:solidFill>
+                <a:schemeClr val="bg1"/>
+              </a:solidFill>
+              <a:latin typeface="+mj-lt"/>
+              <a:ea typeface="+mj-ea"/>
+              <a:cs typeface="+mj-cs"/>
+            </a:endParaRPr>
+          </a:p>
+        </p:txBody>
+      </p:sp>
     </p:spTree>
     <p:extLst>
       <p:ext uri="{BB962C8B-B14F-4D97-AF65-F5344CB8AC3E}">
-        <p14:creationId xmlns:p14="http://schemas.microsoft.com/office/powerpoint/2010/main" val="115190440"/>
+        <p14:creationId xmlns:p14="http://schemas.microsoft.com/office/powerpoint/2010/main" val="4225324002"/>
       </p:ext>
     </p:extLst>
   </p:cSld>

</xml_diff>